<commit_message>
Adding ppt and notes from meeting on 9/16/2021
Meeting notes and ppt from mmeting
</commit_message>
<xml_diff>
--- a/meetings/mtg_9_16_2021.pptx
+++ b/meetings/mtg_9_16_2021.pptx
@@ -4814,8 +4814,17 @@
               <a:rPr lang="en-US" dirty="0">
                 <a:sym typeface="Wingdings" pitchFamily="2" charset="2"/>
               </a:rPr>
-              <a:t> Thursday of Each Month 8am Pacific</a:t>
-            </a:r>
+              <a:t> Thursday of Each Month </a:t>
+            </a:r>
+            <a:r>
+              <a:rPr lang="en-US">
+                <a:sym typeface="Wingdings" pitchFamily="2" charset="2"/>
+              </a:rPr>
+              <a:t>8am Pacific</a:t>
+            </a:r>
+            <a:endParaRPr lang="en-US" dirty="0">
+              <a:sym typeface="Wingdings" pitchFamily="2" charset="2"/>
+            </a:endParaRPr>
           </a:p>
         </p:txBody>
       </p:sp>
@@ -5439,7 +5448,15 @@
           <a:p>
             <a:r>
               <a:rPr lang="en-GB" sz="2600" dirty="0"/>
-              <a:t>Chair – marc Karasek (</a:t>
+              <a:t>Chair </a:t>
+            </a:r>
+            <a:r>
+              <a:rPr lang="en-GB" sz="2600"/>
+              <a:t>– Marc </a:t>
+            </a:r>
+            <a:r>
+              <a:rPr lang="en-GB" sz="2600" dirty="0"/>
+              <a:t>Karasek (</a:t>
             </a:r>
             <a:r>
               <a:rPr lang="en-GB" sz="2600" dirty="0">

</xml_diff>